<commit_message>
Doc: PowerPoint presentation update
</commit_message>
<xml_diff>
--- a/doc/Presentation_yalms.pptx
+++ b/doc/Presentation_yalms.pptx
@@ -5549,21 +5549,8 @@
                   <a:schemeClr val="tx1"/>
                 </a:solidFill>
               </a:rPr>
-              <a:t>Yet Another </a:t>
-            </a:r>
-            <a:r>
-              <a:rPr lang="sv-SE" sz="3800" smtClean="0">
-                <a:solidFill>
-                  <a:schemeClr val="tx1"/>
-                </a:solidFill>
-              </a:rPr>
-              <a:t>Learning Management System</a:t>
-            </a:r>
-            <a:endParaRPr lang="sv-SE" sz="3800" smtClean="0">
-              <a:solidFill>
-                <a:schemeClr val="tx1"/>
-              </a:solidFill>
-            </a:endParaRPr>
+              <a:t>Yet Another Learning Management System</a:t>
+            </a:r>
           </a:p>
           <a:p>
             <a:endParaRPr lang="sv-SE" smtClean="0">
@@ -15213,7 +15200,7 @@
                   <a:schemeClr val="bg1"/>
                 </a:solidFill>
               </a:rPr>
-              <a:t>Inloggningsskärm</a:t>
+              <a:t>Inloggning</a:t>
             </a:r>
             <a:endParaRPr lang="sv-SE">
               <a:solidFill>
@@ -15334,11 +15321,6 @@
               </a:rPr>
               <a:t>❸</a:t>
             </a:r>
-            <a:endParaRPr lang="sv-SE" sz="7200">
-              <a:solidFill>
-                <a:schemeClr val="bg1"/>
-              </a:solidFill>
-            </a:endParaRPr>
           </a:p>
         </p:txBody>
       </p:sp>
@@ -15397,6 +15379,41 @@
       </p:grpSpPr>
       <p:pic>
         <p:nvPicPr>
+          <p:cNvPr id="5" name="Picture 4"/>
+          <p:cNvPicPr>
+            <a:picLocks noChangeAspect="1"/>
+          </p:cNvPicPr>
+          <p:nvPr/>
+        </p:nvPicPr>
+        <p:blipFill>
+          <a:blip r:embed="rId3"/>
+          <a:stretch>
+            <a:fillRect/>
+          </a:stretch>
+        </p:blipFill>
+        <p:spPr>
+          <a:xfrm>
+            <a:off x="4366567" y="1124744"/>
+            <a:ext cx="5534025" cy="4914900"/>
+          </a:xfrm>
+          <a:prstGeom prst="rect">
+            <a:avLst/>
+          </a:prstGeom>
+          <a:effectLst>
+            <a:outerShdw blurRad="50800" dist="38100" dir="5400000" algn="t" rotWithShape="0">
+              <a:prstClr val="black">
+                <a:alpha val="40000"/>
+              </a:prstClr>
+            </a:outerShdw>
+          </a:effectLst>
+          <a:scene3d>
+            <a:camera prst="perspectiveHeroicExtremeLeftFacing"/>
+            <a:lightRig rig="threePt" dir="t"/>
+          </a:scene3d>
+        </p:spPr>
+      </p:pic>
+      <p:pic>
+        <p:nvPicPr>
           <p:cNvPr id="4" name="Picture 3"/>
           <p:cNvPicPr>
             <a:picLocks noChangeAspect="1"/>
@@ -15404,7 +15421,7 @@
           <p:nvPr/>
         </p:nvPicPr>
         <p:blipFill>
-          <a:blip r:embed="rId3">
+          <a:blip r:embed="rId4">
             <a:extLst>
               <a:ext uri="{28A0092B-C50C-407E-A947-70E740481C1C}">
                 <a14:useLocalDpi xmlns:a14="http://schemas.microsoft.com/office/drawing/2010/main" val="0"/>
@@ -15425,25 +15442,41 @@
           </a:prstGeom>
         </p:spPr>
       </p:pic>
-      <p:sp>
-        <p:nvSpPr>
-          <p:cNvPr id="2" name="Subtitle 1"/>
-          <p:cNvSpPr>
-            <a:spLocks noGrp="1"/>
-          </p:cNvSpPr>
-          <p:nvPr>
-            <p:ph type="subTitle" idx="1"/>
-          </p:nvPr>
-        </p:nvSpPr>
-        <p:spPr/>
-        <p:txBody>
-          <a:bodyPr/>
-          <a:lstStyle/>
-          <a:p>
-            <a:endParaRPr lang="sv-SE"/>
-          </a:p>
-        </p:txBody>
-      </p:sp>
+      <p:pic>
+        <p:nvPicPr>
+          <p:cNvPr id="3" name="Picture 2"/>
+          <p:cNvPicPr>
+            <a:picLocks noChangeAspect="1"/>
+          </p:cNvPicPr>
+          <p:nvPr/>
+        </p:nvPicPr>
+        <p:blipFill>
+          <a:blip r:embed="rId5"/>
+          <a:stretch>
+            <a:fillRect/>
+          </a:stretch>
+        </p:blipFill>
+        <p:spPr>
+          <a:xfrm>
+            <a:off x="683568" y="1196752"/>
+            <a:ext cx="4876800" cy="4133850"/>
+          </a:xfrm>
+          <a:prstGeom prst="rect">
+            <a:avLst/>
+          </a:prstGeom>
+          <a:effectLst>
+            <a:outerShdw blurRad="50800" dist="38100" dir="5400000" algn="t" rotWithShape="0">
+              <a:prstClr val="black">
+                <a:alpha val="40000"/>
+              </a:prstClr>
+            </a:outerShdw>
+          </a:effectLst>
+          <a:scene3d>
+            <a:camera prst="perspectiveHeroicExtremeRightFacing"/>
+            <a:lightRig rig="threePt" dir="t"/>
+          </a:scene3d>
+        </p:spPr>
+      </p:pic>
     </p:spTree>
     <p:extLst>
       <p:ext uri="{BB962C8B-B14F-4D97-AF65-F5344CB8AC3E}">
@@ -15562,7 +15595,7 @@
                   <a:schemeClr val="bg1"/>
                 </a:solidFill>
               </a:rPr>
-              <a:t>Inloggningsskärm</a:t>
+              <a:t>Inloggning</a:t>
             </a:r>
           </a:p>
           <a:p>
@@ -15813,6 +15846,13 @@
           <a:prstGeom prst="rect">
             <a:avLst/>
           </a:prstGeom>
+          <a:effectLst>
+            <a:outerShdw blurRad="50800" dist="38100" dir="5400000" algn="t" rotWithShape="0">
+              <a:prstClr val="black">
+                <a:alpha val="40000"/>
+              </a:prstClr>
+            </a:outerShdw>
+          </a:effectLst>
         </p:spPr>
       </p:pic>
     </p:spTree>
@@ -16007,15 +16047,7 @@
                   <a:schemeClr val="bg1"/>
                 </a:solidFill>
               </a:rPr>
-              <a:t>och inte hur layouten ska </a:t>
-            </a:r>
-            <a:r>
-              <a:rPr lang="sv-SE">
-                <a:solidFill>
-                  <a:schemeClr val="bg1"/>
-                </a:solidFill>
-              </a:rPr>
-              <a:t>se </a:t>
+              <a:t>och inte hur layouten ska se </a:t>
             </a:r>
             <a:r>
               <a:rPr lang="sv-SE" smtClean="0">
@@ -16040,7 +16072,15 @@
                   <a:schemeClr val="bg1"/>
                 </a:solidFill>
               </a:rPr>
-              <a:t>PowerPoint duger</a:t>
+              <a:t>PowerPoint </a:t>
+            </a:r>
+            <a:r>
+              <a:rPr lang="sv-SE" smtClean="0">
+                <a:solidFill>
+                  <a:schemeClr val="bg1"/>
+                </a:solidFill>
+              </a:rPr>
+              <a:t>duger gott</a:t>
             </a:r>
             <a:endParaRPr lang="sv-SE">
               <a:solidFill>
@@ -16308,13 +16348,8 @@
                   <a:schemeClr val="bg1"/>
                 </a:solidFill>
               </a:rPr>
-              <a:t>Inloggningsskärm</a:t>
-            </a:r>
-            <a:endParaRPr lang="sv-SE">
-              <a:solidFill>
-                <a:schemeClr val="bg1"/>
-              </a:solidFill>
-            </a:endParaRPr>
+              <a:t>Inloggning</a:t>
+            </a:r>
           </a:p>
           <a:p>
             <a:pPr marL="1800000" indent="-457200" algn="l">
@@ -16325,13 +16360,18 @@
               <a:buChar char="•"/>
             </a:pPr>
             <a:r>
-              <a:rPr lang="sv-SE">
+              <a:rPr lang="sv-SE" smtClean="0">
                 <a:solidFill>
                   <a:schemeClr val="bg1"/>
                 </a:solidFill>
               </a:rPr>
               <a:t>Studentvy</a:t>
             </a:r>
+            <a:endParaRPr lang="sv-SE">
+              <a:solidFill>
+                <a:schemeClr val="bg1"/>
+              </a:solidFill>
+            </a:endParaRPr>
           </a:p>
           <a:p>
             <a:pPr marL="1800000" indent="-457200" algn="l">

</xml_diff>